<commit_message>
Cambios menores en las presentaciones
</commit_message>
<xml_diff>
--- a/Semana3/3_Conceptos básicos.pptx
+++ b/Semana3/3_Conceptos básicos.pptx
@@ -229,7 +229,7 @@
             <a:fld id="{34883353-204B-40A1-9881-741047184E83}" type="datetimeFigureOut">
               <a:rPr lang="es-MX" smtClean="0"/>
               <a:pPr/>
-              <a:t>07/02/2013</a:t>
+              <a:t>04/03/2013</a:t>
             </a:fld>
             <a:endParaRPr lang="es-MX"/>
           </a:p>
@@ -682,7 +682,7 @@
             <a:fld id="{537938F9-DE5D-45A8-B3AB-A3366A0E9B2D}" type="datetime1">
               <a:rPr lang="es-MX" smtClean="0"/>
               <a:pPr/>
-              <a:t>07/02/2013</a:t>
+              <a:t>04/03/2013</a:t>
             </a:fld>
             <a:endParaRPr lang="es-MX"/>
           </a:p>
@@ -849,7 +849,7 @@
             <a:fld id="{E31F7CDD-0A93-4675-B8DD-C9C05C00F055}" type="datetime1">
               <a:rPr lang="es-MX" smtClean="0"/>
               <a:pPr/>
-              <a:t>07/02/2013</a:t>
+              <a:t>04/03/2013</a:t>
             </a:fld>
             <a:endParaRPr lang="es-MX"/>
           </a:p>
@@ -1026,7 +1026,7 @@
             <a:fld id="{CB71321D-38C5-41DF-954B-B0C930F73009}" type="datetime1">
               <a:rPr lang="es-MX" smtClean="0"/>
               <a:pPr/>
-              <a:t>07/02/2013</a:t>
+              <a:t>04/03/2013</a:t>
             </a:fld>
             <a:endParaRPr lang="es-MX"/>
           </a:p>
@@ -1193,7 +1193,7 @@
             <a:fld id="{FA3D4928-204A-4067-9361-04654F48145D}" type="datetime1">
               <a:rPr lang="es-MX" smtClean="0"/>
               <a:pPr/>
-              <a:t>07/02/2013</a:t>
+              <a:t>04/03/2013</a:t>
             </a:fld>
             <a:endParaRPr lang="es-MX"/>
           </a:p>
@@ -1436,7 +1436,7 @@
             <a:fld id="{C92A6D9E-4E3D-4799-B344-694463CBD10D}" type="datetime1">
               <a:rPr lang="es-MX" smtClean="0"/>
               <a:pPr/>
-              <a:t>07/02/2013</a:t>
+              <a:t>04/03/2013</a:t>
             </a:fld>
             <a:endParaRPr lang="es-MX"/>
           </a:p>
@@ -1721,7 +1721,7 @@
             <a:fld id="{71E00685-381D-43D2-A18C-4361BEC8ED54}" type="datetime1">
               <a:rPr lang="es-MX" smtClean="0"/>
               <a:pPr/>
-              <a:t>07/02/2013</a:t>
+              <a:t>04/03/2013</a:t>
             </a:fld>
             <a:endParaRPr lang="es-MX"/>
           </a:p>
@@ -2140,7 +2140,7 @@
             <a:fld id="{8BABFDDB-B803-46E2-AC21-8C743C7BFA9F}" type="datetime1">
               <a:rPr lang="es-MX" smtClean="0"/>
               <a:pPr/>
-              <a:t>07/02/2013</a:t>
+              <a:t>04/03/2013</a:t>
             </a:fld>
             <a:endParaRPr lang="es-MX"/>
           </a:p>
@@ -2255,7 +2255,7 @@
             <a:fld id="{55F9EDB8-D5D5-4342-BB2B-B2A775AA202A}" type="datetime1">
               <a:rPr lang="es-MX" smtClean="0"/>
               <a:pPr/>
-              <a:t>07/02/2013</a:t>
+              <a:t>04/03/2013</a:t>
             </a:fld>
             <a:endParaRPr lang="es-MX"/>
           </a:p>
@@ -2347,7 +2347,7 @@
             <a:fld id="{7CA41EB0-74D2-4DB3-AC16-F80D792943C7}" type="datetime1">
               <a:rPr lang="es-MX" smtClean="0"/>
               <a:pPr/>
-              <a:t>07/02/2013</a:t>
+              <a:t>04/03/2013</a:t>
             </a:fld>
             <a:endParaRPr lang="es-MX"/>
           </a:p>
@@ -2621,7 +2621,7 @@
             <a:fld id="{3A78CDED-690E-48CA-86B0-2951CCDDDD85}" type="datetime1">
               <a:rPr lang="es-MX" smtClean="0"/>
               <a:pPr/>
-              <a:t>07/02/2013</a:t>
+              <a:t>04/03/2013</a:t>
             </a:fld>
             <a:endParaRPr lang="es-MX"/>
           </a:p>
@@ -2871,7 +2871,7 @@
             <a:fld id="{DA2DA003-ED64-4995-931C-E4EB6560431F}" type="datetime1">
               <a:rPr lang="es-MX" smtClean="0"/>
               <a:pPr/>
-              <a:t>07/02/2013</a:t>
+              <a:t>04/03/2013</a:t>
             </a:fld>
             <a:endParaRPr lang="es-MX"/>
           </a:p>
@@ -3081,7 +3081,7 @@
             <a:fld id="{6D1E4D9D-AA33-40BA-9CBF-5DBBF687A008}" type="datetime1">
               <a:rPr lang="es-MX" smtClean="0"/>
               <a:pPr/>
-              <a:t>07/02/2013</a:t>
+              <a:t>04/03/2013</a:t>
             </a:fld>
             <a:endParaRPr lang="es-MX"/>
           </a:p>
@@ -3617,7 +3617,7 @@
             <a:fld id="{FA3D4928-204A-4067-9361-04654F48145D}" type="datetime1">
               <a:rPr lang="es-MX" smtClean="0"/>
               <a:pPr/>
-              <a:t>07/02/2013</a:t>
+              <a:t>04/03/2013</a:t>
             </a:fld>
             <a:endParaRPr lang="es-MX"/>
           </a:p>
@@ -3784,7 +3784,7 @@
             <a:fld id="{FA3D4928-204A-4067-9361-04654F48145D}" type="datetime1">
               <a:rPr lang="es-MX" smtClean="0"/>
               <a:pPr/>
-              <a:t>07/02/2013</a:t>
+              <a:t>04/03/2013</a:t>
             </a:fld>
             <a:endParaRPr lang="es-MX"/>
           </a:p>
@@ -3932,7 +3932,7 @@
             <a:fld id="{FA3D4928-204A-4067-9361-04654F48145D}" type="datetime1">
               <a:rPr lang="es-MX" smtClean="0"/>
               <a:pPr/>
-              <a:t>07/02/2013</a:t>
+              <a:t>04/03/2013</a:t>
             </a:fld>
             <a:endParaRPr lang="es-MX"/>
           </a:p>
@@ -3967,6 +3967,13 @@
   <p:clrMapOvr>
     <a:masterClrMapping/>
   </p:clrMapOvr>
+  <p:timing>
+    <p:tnLst>
+      <p:par>
+        <p:cTn id="1" dur="indefinite" restart="never" nodeType="tmRoot"/>
+      </p:par>
+    </p:tnLst>
+  </p:timing>
 </p:sld>
 </file>
 
@@ -4078,7 +4085,7 @@
             <a:fld id="{7CDAEAE1-7ECD-4D09-84E4-0001B9014A73}" type="datetime1">
               <a:rPr lang="es-MX" smtClean="0"/>
               <a:pPr/>
-              <a:t>07/02/2013</a:t>
+              <a:t>04/03/2013</a:t>
             </a:fld>
             <a:endParaRPr lang="es-MX"/>
           </a:p>
@@ -4222,7 +4229,7 @@
             <a:fld id="{884A6ADF-D9A2-43F4-89B9-71B9C9A8B0AE}" type="datetime1">
               <a:rPr lang="es-MX" smtClean="0"/>
               <a:pPr/>
-              <a:t>07/02/2013</a:t>
+              <a:t>04/03/2013</a:t>
             </a:fld>
             <a:endParaRPr lang="es-MX"/>
           </a:p>
@@ -4370,7 +4377,7 @@
             <a:fld id="{8A6D28A9-4F67-4432-996F-7D9C0F1335A9}" type="datetime1">
               <a:rPr lang="es-MX" smtClean="0"/>
               <a:pPr/>
-              <a:t>07/02/2013</a:t>
+              <a:t>04/03/2013</a:t>
             </a:fld>
             <a:endParaRPr lang="es-MX"/>
           </a:p>
@@ -4513,7 +4520,7 @@
             <a:fld id="{3289593D-3617-4D9E-BAD9-967E24E83200}" type="datetime1">
               <a:rPr lang="es-MX" smtClean="0"/>
               <a:pPr/>
-              <a:t>07/02/2013</a:t>
+              <a:t>04/03/2013</a:t>
             </a:fld>
             <a:endParaRPr lang="es-MX"/>
           </a:p>
@@ -4635,7 +4642,7 @@
             <a:fld id="{FA3D4928-204A-4067-9361-04654F48145D}" type="datetime1">
               <a:rPr lang="es-MX" smtClean="0"/>
               <a:pPr/>
-              <a:t>07/02/2013</a:t>
+              <a:t>04/03/2013</a:t>
             </a:fld>
             <a:endParaRPr lang="es-MX"/>
           </a:p>
@@ -4807,7 +4814,7 @@
             <a:fld id="{9D5CABD7-44D1-4B99-A257-8E7CFFEE9C82}" type="datetime1">
               <a:rPr lang="es-MX" smtClean="0"/>
               <a:pPr/>
-              <a:t>07/02/2013</a:t>
+              <a:t>04/03/2013</a:t>
             </a:fld>
             <a:endParaRPr lang="es-MX"/>
           </a:p>
@@ -5436,7 +5443,7 @@
             <a:fld id="{7C7AD0A3-63F2-4F79-ACC2-E85F25B4FFEF}" type="datetime1">
               <a:rPr lang="es-MX" smtClean="0"/>
               <a:pPr/>
-              <a:t>07/02/2013</a:t>
+              <a:t>04/03/2013</a:t>
             </a:fld>
             <a:endParaRPr lang="es-MX"/>
           </a:p>
@@ -5563,7 +5570,7 @@
             <a:fld id="{FA3D4928-204A-4067-9361-04654F48145D}" type="datetime1">
               <a:rPr lang="es-MX" smtClean="0"/>
               <a:pPr/>
-              <a:t>07/02/2013</a:t>
+              <a:t>04/03/2013</a:t>
             </a:fld>
             <a:endParaRPr lang="es-MX"/>
           </a:p>
@@ -5702,7 +5709,13 @@
           <p:cNvGraphicFramePr>
             <a:graphicFrameLocks noGrp="1"/>
           </p:cNvGraphicFramePr>
-          <p:nvPr/>
+          <p:nvPr>
+            <p:extLst>
+              <p:ext uri="{D42A27DB-BD31-4B8C-83A1-F6EECF244321}">
+                <p14:modId xmlns:p14="http://schemas.microsoft.com/office/powerpoint/2010/main" val="4077944927"/>
+              </p:ext>
+            </p:extLst>
+          </p:nvPr>
         </p:nvGraphicFramePr>
         <p:xfrm>
           <a:off x="0" y="620688"/>
@@ -5819,24 +5832,24 @@
                         <a:t>Bandera </a:t>
                       </a:r>
                       <a:r>
-                        <a:rPr lang="es-MX" dirty="0" err="1" smtClean="0"/>
-                        <a:t>pradidad</a:t>
-                      </a:r>
-                      <a:r>
                         <a:rPr lang="es-MX" dirty="0" smtClean="0"/>
-                        <a:t>,</a:t>
+                        <a:t>paridad,</a:t>
                       </a:r>
                       <a:r>
                         <a:rPr lang="es-MX" baseline="0" dirty="0" smtClean="0"/>
-                        <a:t> es 1 si el resultado de una </a:t>
-                      </a:r>
-                      <a:r>
-                        <a:rPr lang="es-MX" baseline="0" dirty="0" err="1" smtClean="0"/>
-                        <a:t>opración</a:t>
+                        <a:t> </a:t>
                       </a:r>
                       <a:r>
                         <a:rPr lang="es-MX" baseline="0" dirty="0" smtClean="0"/>
-                        <a:t> de datos tiene un número par de bits iguales 1.</a:t>
+                        <a:t>es 1 si el resultado de una </a:t>
+                      </a:r>
+                      <a:r>
+                        <a:rPr lang="es-MX" baseline="0" dirty="0" smtClean="0"/>
+                        <a:t>operación </a:t>
+                      </a:r>
+                      <a:r>
+                        <a:rPr lang="es-MX" baseline="0" dirty="0" smtClean="0"/>
+                        <a:t>de datos tiene un número par de bits iguales 1.</a:t>
                       </a:r>
                       <a:endParaRPr lang="es-MX" dirty="0"/>
                     </a:p>
@@ -6100,7 +6113,7 @@
             <a:fld id="{EB319151-1BF9-49FB-879E-C082198A6C45}" type="datetime1">
               <a:rPr lang="es-MX" smtClean="0"/>
               <a:pPr/>
-              <a:t>07/02/2013</a:t>
+              <a:t>04/03/2013</a:t>
             </a:fld>
             <a:endParaRPr lang="es-MX"/>
           </a:p>
@@ -6219,7 +6232,7 @@
             <a:fld id="{8CD46784-60A2-4C3A-A6D8-048CC7442541}" type="datetime1">
               <a:rPr lang="es-MX" smtClean="0"/>
               <a:pPr/>
-              <a:t>07/02/2013</a:t>
+              <a:t>04/03/2013</a:t>
             </a:fld>
             <a:endParaRPr lang="es-MX"/>
           </a:p>
@@ -6375,7 +6388,7 @@
             <a:fld id="{FA3D4928-204A-4067-9361-04654F48145D}" type="datetime1">
               <a:rPr lang="es-MX" smtClean="0"/>
               <a:pPr/>
-              <a:t>07/02/2013</a:t>
+              <a:t>04/03/2013</a:t>
             </a:fld>
             <a:endParaRPr lang="es-MX"/>
           </a:p>
@@ -6462,6 +6475,13 @@
   <p:clrMapOvr>
     <a:masterClrMapping/>
   </p:clrMapOvr>
+  <p:timing>
+    <p:tnLst>
+      <p:par>
+        <p:cTn id="1" dur="indefinite" restart="never" nodeType="tmRoot"/>
+      </p:par>
+    </p:tnLst>
+  </p:timing>
 </p:sld>
 </file>
 
@@ -6611,7 +6631,7 @@
             <a:fld id="{FA3D4928-204A-4067-9361-04654F48145D}" type="datetime1">
               <a:rPr lang="es-MX" smtClean="0"/>
               <a:pPr/>
-              <a:t>07/02/2013</a:t>
+              <a:t>04/03/2013</a:t>
             </a:fld>
             <a:endParaRPr lang="es-MX"/>
           </a:p>
@@ -6646,6 +6666,13 @@
   <p:clrMapOvr>
     <a:masterClrMapping/>
   </p:clrMapOvr>
+  <p:timing>
+    <p:tnLst>
+      <p:par>
+        <p:cTn id="1" dur="indefinite" restart="never" nodeType="tmRoot"/>
+      </p:par>
+    </p:tnLst>
+  </p:timing>
 </p:sld>
 </file>
 
@@ -6759,7 +6786,7 @@
             <a:fld id="{FA3D4928-204A-4067-9361-04654F48145D}" type="datetime1">
               <a:rPr lang="es-MX" smtClean="0"/>
               <a:pPr/>
-              <a:t>07/02/2013</a:t>
+              <a:t>04/03/2013</a:t>
             </a:fld>
             <a:endParaRPr lang="es-MX"/>
           </a:p>
@@ -6794,6 +6821,13 @@
   <p:clrMapOvr>
     <a:masterClrMapping/>
   </p:clrMapOvr>
+  <p:timing>
+    <p:tnLst>
+      <p:par>
+        <p:cTn id="1" dur="indefinite" restart="never" nodeType="tmRoot"/>
+      </p:par>
+    </p:tnLst>
+  </p:timing>
 </p:sld>
 </file>
 
@@ -6916,7 +6950,7 @@
             <a:fld id="{FA3D4928-204A-4067-9361-04654F48145D}" type="datetime1">
               <a:rPr lang="es-MX" smtClean="0"/>
               <a:pPr/>
-              <a:t>07/02/2013</a:t>
+              <a:t>04/03/2013</a:t>
             </a:fld>
             <a:endParaRPr lang="es-MX"/>
           </a:p>
@@ -6951,6 +6985,13 @@
   <p:clrMapOvr>
     <a:masterClrMapping/>
   </p:clrMapOvr>
+  <p:timing>
+    <p:tnLst>
+      <p:par>
+        <p:cTn id="1" dur="indefinite" restart="never" nodeType="tmRoot"/>
+      </p:par>
+    </p:tnLst>
+  </p:timing>
 </p:sld>
 </file>
 
@@ -7055,7 +7096,7 @@
             <a:fld id="{1B9DDB1B-7540-44F1-A828-37B13A1AE71D}" type="datetime1">
               <a:rPr lang="es-MX" smtClean="0"/>
               <a:pPr/>
-              <a:t>07/02/2013</a:t>
+              <a:t>04/03/2013</a:t>
             </a:fld>
             <a:endParaRPr lang="es-MX"/>
           </a:p>
@@ -7214,7 +7255,7 @@
             <a:fld id="{70225914-0001-4B98-8B3F-34CD0E7937D3}" type="datetime1">
               <a:rPr lang="es-MX" smtClean="0"/>
               <a:pPr/>
-              <a:t>07/02/2013</a:t>
+              <a:t>04/03/2013</a:t>
             </a:fld>
             <a:endParaRPr lang="es-MX"/>
           </a:p>
@@ -7345,7 +7386,7 @@
             <a:fld id="{BB09AEC3-55A6-411A-8D64-9DA1D6F59888}" type="datetime1">
               <a:rPr lang="es-MX" smtClean="0"/>
               <a:pPr/>
-              <a:t>07/02/2013</a:t>
+              <a:t>04/03/2013</a:t>
             </a:fld>
             <a:endParaRPr lang="es-MX"/>
           </a:p>
@@ -7498,7 +7539,7 @@
             <a:fld id="{535E5725-165F-4520-9350-478B24AC40C9}" type="datetime1">
               <a:rPr lang="es-MX" smtClean="0"/>
               <a:pPr/>
-              <a:t>07/02/2013</a:t>
+              <a:t>04/03/2013</a:t>
             </a:fld>
             <a:endParaRPr lang="es-MX"/>
           </a:p>
@@ -7672,7 +7713,7 @@
             <a:fld id="{FA3D4928-204A-4067-9361-04654F48145D}" type="datetime1">
               <a:rPr lang="es-MX" smtClean="0"/>
               <a:pPr/>
-              <a:t>07/02/2013</a:t>
+              <a:t>04/03/2013</a:t>
             </a:fld>
             <a:endParaRPr lang="es-MX"/>
           </a:p>
@@ -7837,7 +7878,7 @@
             <a:fld id="{3138EB64-02F5-4387-8A4A-19D0B4E576A8}" type="datetime1">
               <a:rPr lang="es-MX" smtClean="0"/>
               <a:pPr/>
-              <a:t>07/02/2013</a:t>
+              <a:t>04/03/2013</a:t>
             </a:fld>
             <a:endParaRPr lang="es-MX"/>
           </a:p>
@@ -8025,7 +8066,7 @@
             <a:fld id="{386BA44C-0675-4D37-9372-B7F51F431E23}" type="datetime1">
               <a:rPr lang="es-MX" smtClean="0"/>
               <a:pPr/>
-              <a:t>07/02/2013</a:t>
+              <a:t>04/03/2013</a:t>
             </a:fld>
             <a:endParaRPr lang="es-MX"/>
           </a:p>
@@ -8176,7 +8217,7 @@
             <a:fld id="{FA3D4928-204A-4067-9361-04654F48145D}" type="datetime1">
               <a:rPr lang="es-MX" smtClean="0"/>
               <a:pPr/>
-              <a:t>07/02/2013</a:t>
+              <a:t>04/03/2013</a:t>
             </a:fld>
             <a:endParaRPr lang="es-MX"/>
           </a:p>
@@ -8211,6 +8252,13 @@
   <p:clrMapOvr>
     <a:masterClrMapping/>
   </p:clrMapOvr>
+  <p:timing>
+    <p:tnLst>
+      <p:par>
+        <p:cTn id="1" dur="indefinite" restart="never" nodeType="tmRoot"/>
+      </p:par>
+    </p:tnLst>
+  </p:timing>
 </p:sld>
 </file>
 
@@ -8315,7 +8363,7 @@
             <a:fld id="{FA3D4928-204A-4067-9361-04654F48145D}" type="datetime1">
               <a:rPr lang="es-MX" smtClean="0"/>
               <a:pPr/>
-              <a:t>07/02/2013</a:t>
+              <a:t>04/03/2013</a:t>
             </a:fld>
             <a:endParaRPr lang="es-MX"/>
           </a:p>
@@ -8350,6 +8398,13 @@
   <p:clrMapOvr>
     <a:masterClrMapping/>
   </p:clrMapOvr>
+  <p:timing>
+    <p:tnLst>
+      <p:par>
+        <p:cTn id="1" dur="indefinite" restart="never" nodeType="tmRoot"/>
+      </p:par>
+    </p:tnLst>
+  </p:timing>
 </p:sld>
 </file>
 
@@ -8465,7 +8520,7 @@
             <a:fld id="{FA3D4928-204A-4067-9361-04654F48145D}" type="datetime1">
               <a:rPr lang="es-MX" smtClean="0"/>
               <a:pPr/>
-              <a:t>07/02/2013</a:t>
+              <a:t>04/03/2013</a:t>
             </a:fld>
             <a:endParaRPr lang="es-MX"/>
           </a:p>
@@ -8744,7 +8799,7 @@
             <a:fld id="{FA3D4928-204A-4067-9361-04654F48145D}" type="datetime1">
               <a:rPr lang="es-MX" smtClean="0"/>
               <a:pPr/>
-              <a:t>07/02/2013</a:t>
+              <a:t>04/03/2013</a:t>
             </a:fld>
             <a:endParaRPr lang="es-MX"/>
           </a:p>
@@ -8892,7 +8947,7 @@
             <a:fld id="{FA3D4928-204A-4067-9361-04654F48145D}" type="datetime1">
               <a:rPr lang="es-MX" smtClean="0"/>
               <a:pPr/>
-              <a:t>07/02/2013</a:t>
+              <a:t>04/03/2013</a:t>
             </a:fld>
             <a:endParaRPr lang="es-MX"/>
           </a:p>
@@ -9055,7 +9110,7 @@
             <a:fld id="{FA3D4928-204A-4067-9361-04654F48145D}" type="datetime1">
               <a:rPr lang="es-MX" smtClean="0"/>
               <a:pPr/>
-              <a:t>07/02/2013</a:t>
+              <a:t>04/03/2013</a:t>
             </a:fld>
             <a:endParaRPr lang="es-MX"/>
           </a:p>
@@ -9197,7 +9252,7 @@
             <a:fld id="{FA3D4928-204A-4067-9361-04654F48145D}" type="datetime1">
               <a:rPr lang="es-MX" smtClean="0"/>
               <a:pPr/>
-              <a:t>07/02/2013</a:t>
+              <a:t>04/03/2013</a:t>
             </a:fld>
             <a:endParaRPr lang="es-MX"/>
           </a:p>
@@ -9479,7 +9534,7 @@
             <a:fld id="{FA3D4928-204A-4067-9361-04654F48145D}" type="datetime1">
               <a:rPr lang="es-MX" smtClean="0"/>
               <a:pPr/>
-              <a:t>07/02/2013</a:t>
+              <a:t>04/03/2013</a:t>
             </a:fld>
             <a:endParaRPr lang="es-MX"/>
           </a:p>
@@ -9884,7 +9939,7 @@
             <a:fld id="{FA3D4928-204A-4067-9361-04654F48145D}" type="datetime1">
               <a:rPr lang="es-MX" smtClean="0"/>
               <a:pPr/>
-              <a:t>07/02/2013</a:t>
+              <a:t>04/03/2013</a:t>
             </a:fld>
             <a:endParaRPr lang="es-MX"/>
           </a:p>
@@ -10072,7 +10127,7 @@
             <a:fld id="{FA3D4928-204A-4067-9361-04654F48145D}" type="datetime1">
               <a:rPr lang="es-MX" smtClean="0"/>
               <a:pPr/>
-              <a:t>07/02/2013</a:t>
+              <a:t>04/03/2013</a:t>
             </a:fld>
             <a:endParaRPr lang="es-MX"/>
           </a:p>
@@ -10250,7 +10305,7 @@
             <a:fld id="{FA3D4928-204A-4067-9361-04654F48145D}" type="datetime1">
               <a:rPr lang="es-MX" smtClean="0"/>
               <a:pPr/>
-              <a:t>07/02/2013</a:t>
+              <a:t>04/03/2013</a:t>
             </a:fld>
             <a:endParaRPr lang="es-MX"/>
           </a:p>
@@ -10424,7 +10479,7 @@
             <a:fld id="{FA3D4928-204A-4067-9361-04654F48145D}" type="datetime1">
               <a:rPr lang="es-MX" smtClean="0"/>
               <a:pPr/>
-              <a:t>07/02/2013</a:t>
+              <a:t>04/03/2013</a:t>
             </a:fld>
             <a:endParaRPr lang="es-MX"/>
           </a:p>

</xml_diff>